<commit_message>
feature: 1.qseq, stkseq on the way \n2. icon on the way
</commit_message>
<xml_diff>
--- a/icon/icon.pptx
+++ b/icon/icon.pptx
@@ -107,6 +107,14 @@
       </a:defRPr>
     </a:lvl9pPr>
   </p:defaultTextStyle>
+  <p:extLst>
+    <p:ext uri="{EFAFB233-063F-42B5-8137-9DF3F51BA10A}">
+      <p15:sldGuideLst xmlns:p15="http://schemas.microsoft.com/office/powerpoint/2012/main"/>
+    </p:ext>
+    <p:ext uri="{2D200454-40CA-4A62-9FC3-DE9A4176ACB9}">
+      <p15:notesGuideLst xmlns:p15="http://schemas.microsoft.com/office/powerpoint/2012/main"/>
+    </p:ext>
+  </p:extLst>
 </p:presentation>
 </file>
 
@@ -192,7 +200,7 @@
           <a:p>
             <a:fld id="{B47C6596-61A5-5A46-8C77-EC0AC13656F7}" type="datetimeFigureOut">
               <a:rPr lang="en-CN" smtClean="0"/>
-              <a:t>2021/9/1</a:t>
+              <a:t>09/02/2021</a:t>
             </a:fld>
             <a:endParaRPr lang="en-CN"/>
           </a:p>
@@ -693,7 +701,7 @@
           <a:p>
             <a:fld id="{CF7FE675-94F4-AB45-A198-738FC2C026CA}" type="datetimeFigureOut">
               <a:rPr lang="en-CN" smtClean="0"/>
-              <a:t>2021/9/1</a:t>
+              <a:t>09/02/2021</a:t>
             </a:fld>
             <a:endParaRPr lang="en-CN"/>
           </a:p>
@@ -893,7 +901,7 @@
           <a:p>
             <a:fld id="{CF7FE675-94F4-AB45-A198-738FC2C026CA}" type="datetimeFigureOut">
               <a:rPr lang="en-CN" smtClean="0"/>
-              <a:t>2021/9/1</a:t>
+              <a:t>09/02/2021</a:t>
             </a:fld>
             <a:endParaRPr lang="en-CN"/>
           </a:p>
@@ -1103,7 +1111,7 @@
           <a:p>
             <a:fld id="{CF7FE675-94F4-AB45-A198-738FC2C026CA}" type="datetimeFigureOut">
               <a:rPr lang="en-CN" smtClean="0"/>
-              <a:t>2021/9/1</a:t>
+              <a:t>09/02/2021</a:t>
             </a:fld>
             <a:endParaRPr lang="en-CN"/>
           </a:p>
@@ -1303,7 +1311,7 @@
           <a:p>
             <a:fld id="{CF7FE675-94F4-AB45-A198-738FC2C026CA}" type="datetimeFigureOut">
               <a:rPr lang="en-CN" smtClean="0"/>
-              <a:t>2021/9/1</a:t>
+              <a:t>09/02/2021</a:t>
             </a:fld>
             <a:endParaRPr lang="en-CN"/>
           </a:p>
@@ -1579,7 +1587,7 @@
           <a:p>
             <a:fld id="{CF7FE675-94F4-AB45-A198-738FC2C026CA}" type="datetimeFigureOut">
               <a:rPr lang="en-CN" smtClean="0"/>
-              <a:t>2021/9/1</a:t>
+              <a:t>09/02/2021</a:t>
             </a:fld>
             <a:endParaRPr lang="en-CN"/>
           </a:p>
@@ -1847,7 +1855,7 @@
           <a:p>
             <a:fld id="{CF7FE675-94F4-AB45-A198-738FC2C026CA}" type="datetimeFigureOut">
               <a:rPr lang="en-CN" smtClean="0"/>
-              <a:t>2021/9/1</a:t>
+              <a:t>09/02/2021</a:t>
             </a:fld>
             <a:endParaRPr lang="en-CN"/>
           </a:p>
@@ -2262,7 +2270,7 @@
           <a:p>
             <a:fld id="{CF7FE675-94F4-AB45-A198-738FC2C026CA}" type="datetimeFigureOut">
               <a:rPr lang="en-CN" smtClean="0"/>
-              <a:t>2021/9/1</a:t>
+              <a:t>09/02/2021</a:t>
             </a:fld>
             <a:endParaRPr lang="en-CN"/>
           </a:p>
@@ -2404,7 +2412,7 @@
           <a:p>
             <a:fld id="{CF7FE675-94F4-AB45-A198-738FC2C026CA}" type="datetimeFigureOut">
               <a:rPr lang="en-CN" smtClean="0"/>
-              <a:t>2021/9/1</a:t>
+              <a:t>09/02/2021</a:t>
             </a:fld>
             <a:endParaRPr lang="en-CN"/>
           </a:p>
@@ -2517,7 +2525,7 @@
           <a:p>
             <a:fld id="{CF7FE675-94F4-AB45-A198-738FC2C026CA}" type="datetimeFigureOut">
               <a:rPr lang="en-CN" smtClean="0"/>
-              <a:t>2021/9/1</a:t>
+              <a:t>09/02/2021</a:t>
             </a:fld>
             <a:endParaRPr lang="en-CN"/>
           </a:p>
@@ -2830,7 +2838,7 @@
           <a:p>
             <a:fld id="{CF7FE675-94F4-AB45-A198-738FC2C026CA}" type="datetimeFigureOut">
               <a:rPr lang="en-CN" smtClean="0"/>
-              <a:t>2021/9/1</a:t>
+              <a:t>09/02/2021</a:t>
             </a:fld>
             <a:endParaRPr lang="en-CN"/>
           </a:p>
@@ -3119,7 +3127,7 @@
           <a:p>
             <a:fld id="{CF7FE675-94F4-AB45-A198-738FC2C026CA}" type="datetimeFigureOut">
               <a:rPr lang="en-CN" smtClean="0"/>
-              <a:t>2021/9/1</a:t>
+              <a:t>09/02/2021</a:t>
             </a:fld>
             <a:endParaRPr lang="en-CN"/>
           </a:p>
@@ -3362,7 +3370,7 @@
           <a:p>
             <a:fld id="{CF7FE675-94F4-AB45-A198-738FC2C026CA}" type="datetimeFigureOut">
               <a:rPr lang="en-CN" smtClean="0"/>
-              <a:t>2021/9/1</a:t>
+              <a:t>09/02/2021</a:t>
             </a:fld>
             <a:endParaRPr lang="en-CN"/>
           </a:p>
@@ -3911,6 +3919,519 @@
           </a:fontRef>
         </p:style>
       </p:cxnSp>
+      <p:cxnSp>
+        <p:nvCxnSpPr>
+          <p:cNvPr id="3" name="直接连接符 2">
+            <a:extLst>
+              <a:ext uri="{FF2B5EF4-FFF2-40B4-BE49-F238E27FC236}">
+                <a16:creationId xmlns:a16="http://schemas.microsoft.com/office/drawing/2014/main" id="{67AB3D0F-651E-4587-B5FB-EF49BA2DA761}"/>
+              </a:ext>
+            </a:extLst>
+          </p:cNvPr>
+          <p:cNvCxnSpPr>
+            <a:cxnSpLocks/>
+          </p:cNvCxnSpPr>
+          <p:nvPr/>
+        </p:nvCxnSpPr>
+        <p:spPr>
+          <a:xfrm>
+            <a:off x="3240233" y="4316506"/>
+            <a:ext cx="1673548" cy="0"/>
+          </a:xfrm>
+          <a:prstGeom prst="line">
+            <a:avLst/>
+          </a:prstGeom>
+          <a:ln w="25400"/>
+        </p:spPr>
+        <p:style>
+          <a:lnRef idx="2">
+            <a:schemeClr val="dk1"/>
+          </a:lnRef>
+          <a:fillRef idx="1">
+            <a:schemeClr val="lt1"/>
+          </a:fillRef>
+          <a:effectRef idx="0">
+            <a:schemeClr val="dk1"/>
+          </a:effectRef>
+          <a:fontRef idx="minor">
+            <a:schemeClr val="dk1"/>
+          </a:fontRef>
+        </p:style>
+      </p:cxnSp>
+      <p:cxnSp>
+        <p:nvCxnSpPr>
+          <p:cNvPr id="7" name="直接连接符 6">
+            <a:extLst>
+              <a:ext uri="{FF2B5EF4-FFF2-40B4-BE49-F238E27FC236}">
+                <a16:creationId xmlns:a16="http://schemas.microsoft.com/office/drawing/2014/main" id="{E87B83AE-E287-4F25-A74D-D96772251A8A}"/>
+              </a:ext>
+            </a:extLst>
+          </p:cNvPr>
+          <p:cNvCxnSpPr>
+            <a:cxnSpLocks/>
+          </p:cNvCxnSpPr>
+          <p:nvPr/>
+        </p:nvCxnSpPr>
+        <p:spPr>
+          <a:xfrm>
+            <a:off x="3240233" y="4892490"/>
+            <a:ext cx="1673548" cy="0"/>
+          </a:xfrm>
+          <a:prstGeom prst="line">
+            <a:avLst/>
+          </a:prstGeom>
+          <a:ln w="25400"/>
+        </p:spPr>
+        <p:style>
+          <a:lnRef idx="2">
+            <a:schemeClr val="dk1"/>
+          </a:lnRef>
+          <a:fillRef idx="1">
+            <a:schemeClr val="lt1"/>
+          </a:fillRef>
+          <a:effectRef idx="0">
+            <a:schemeClr val="dk1"/>
+          </a:effectRef>
+          <a:fontRef idx="minor">
+            <a:schemeClr val="dk1"/>
+          </a:fontRef>
+        </p:style>
+      </p:cxnSp>
+      <p:sp>
+        <p:nvSpPr>
+          <p:cNvPr id="10" name="矩形 9">
+            <a:extLst>
+              <a:ext uri="{FF2B5EF4-FFF2-40B4-BE49-F238E27FC236}">
+                <a16:creationId xmlns:a16="http://schemas.microsoft.com/office/drawing/2014/main" id="{49A0E667-B5A1-4D7A-A1AA-A72DF5910229}"/>
+              </a:ext>
+            </a:extLst>
+          </p:cNvPr>
+          <p:cNvSpPr/>
+          <p:nvPr/>
+        </p:nvSpPr>
+        <p:spPr>
+          <a:xfrm>
+            <a:off x="3570194" y="4383741"/>
+            <a:ext cx="292788" cy="437027"/>
+          </a:xfrm>
+          <a:prstGeom prst="rect">
+            <a:avLst/>
+          </a:prstGeom>
+          <a:ln w="25400"/>
+        </p:spPr>
+        <p:style>
+          <a:lnRef idx="2">
+            <a:schemeClr val="dk1"/>
+          </a:lnRef>
+          <a:fillRef idx="1">
+            <a:schemeClr val="lt1"/>
+          </a:fillRef>
+          <a:effectRef idx="0">
+            <a:schemeClr val="dk1"/>
+          </a:effectRef>
+          <a:fontRef idx="minor">
+            <a:schemeClr val="dk1"/>
+          </a:fontRef>
+        </p:style>
+        <p:txBody>
+          <a:bodyPr rtlCol="0" anchor="ctr"/>
+          <a:lstStyle/>
+          <a:p>
+            <a:pPr algn="ctr"/>
+            <a:endParaRPr lang="zh-CN" altLang="en-US"/>
+          </a:p>
+        </p:txBody>
+      </p:sp>
+      <p:sp>
+        <p:nvSpPr>
+          <p:cNvPr id="11" name="矩形 10">
+            <a:extLst>
+              <a:ext uri="{FF2B5EF4-FFF2-40B4-BE49-F238E27FC236}">
+                <a16:creationId xmlns:a16="http://schemas.microsoft.com/office/drawing/2014/main" id="{DDE90B15-29AF-4BC4-9A1E-7C576E43149B}"/>
+              </a:ext>
+            </a:extLst>
+          </p:cNvPr>
+          <p:cNvSpPr/>
+          <p:nvPr/>
+        </p:nvSpPr>
+        <p:spPr>
+          <a:xfrm>
+            <a:off x="3914497" y="4383740"/>
+            <a:ext cx="292788" cy="437027"/>
+          </a:xfrm>
+          <a:prstGeom prst="rect">
+            <a:avLst/>
+          </a:prstGeom>
+          <a:ln w="25400"/>
+        </p:spPr>
+        <p:style>
+          <a:lnRef idx="2">
+            <a:schemeClr val="dk1"/>
+          </a:lnRef>
+          <a:fillRef idx="1">
+            <a:schemeClr val="lt1"/>
+          </a:fillRef>
+          <a:effectRef idx="0">
+            <a:schemeClr val="dk1"/>
+          </a:effectRef>
+          <a:fontRef idx="minor">
+            <a:schemeClr val="dk1"/>
+          </a:fontRef>
+        </p:style>
+        <p:txBody>
+          <a:bodyPr rtlCol="0" anchor="ctr"/>
+          <a:lstStyle/>
+          <a:p>
+            <a:pPr algn="ctr"/>
+            <a:endParaRPr lang="zh-CN" altLang="en-US"/>
+          </a:p>
+        </p:txBody>
+      </p:sp>
+      <p:sp>
+        <p:nvSpPr>
+          <p:cNvPr id="12" name="矩形 11">
+            <a:extLst>
+              <a:ext uri="{FF2B5EF4-FFF2-40B4-BE49-F238E27FC236}">
+                <a16:creationId xmlns:a16="http://schemas.microsoft.com/office/drawing/2014/main" id="{3A33048E-A9C9-4150-91A8-748377F25408}"/>
+              </a:ext>
+            </a:extLst>
+          </p:cNvPr>
+          <p:cNvSpPr/>
+          <p:nvPr/>
+        </p:nvSpPr>
+        <p:spPr>
+          <a:xfrm>
+            <a:off x="4258800" y="4383741"/>
+            <a:ext cx="292788" cy="437027"/>
+          </a:xfrm>
+          <a:prstGeom prst="rect">
+            <a:avLst/>
+          </a:prstGeom>
+          <a:ln w="25400"/>
+        </p:spPr>
+        <p:style>
+          <a:lnRef idx="2">
+            <a:schemeClr val="dk1"/>
+          </a:lnRef>
+          <a:fillRef idx="1">
+            <a:schemeClr val="lt1"/>
+          </a:fillRef>
+          <a:effectRef idx="0">
+            <a:schemeClr val="dk1"/>
+          </a:effectRef>
+          <a:fontRef idx="minor">
+            <a:schemeClr val="dk1"/>
+          </a:fontRef>
+        </p:style>
+        <p:txBody>
+          <a:bodyPr rtlCol="0" anchor="ctr"/>
+          <a:lstStyle/>
+          <a:p>
+            <a:pPr algn="ctr"/>
+            <a:endParaRPr lang="zh-CN" altLang="en-US"/>
+          </a:p>
+        </p:txBody>
+      </p:sp>
+      <p:cxnSp>
+        <p:nvCxnSpPr>
+          <p:cNvPr id="15" name="直接箭头连接符 14">
+            <a:extLst>
+              <a:ext uri="{FF2B5EF4-FFF2-40B4-BE49-F238E27FC236}">
+                <a16:creationId xmlns:a16="http://schemas.microsoft.com/office/drawing/2014/main" id="{27667381-B01B-45AB-9086-EEF7852D74FE}"/>
+              </a:ext>
+            </a:extLst>
+          </p:cNvPr>
+          <p:cNvCxnSpPr>
+            <a:cxnSpLocks/>
+          </p:cNvCxnSpPr>
+          <p:nvPr/>
+        </p:nvCxnSpPr>
+        <p:spPr>
+          <a:xfrm flipV="1">
+            <a:off x="4646242" y="4605612"/>
+            <a:ext cx="265438" cy="2"/>
+          </a:xfrm>
+          <a:prstGeom prst="straightConnector1">
+            <a:avLst/>
+          </a:prstGeom>
+          <a:ln w="25400">
+            <a:tailEnd type="triangle"/>
+          </a:ln>
+        </p:spPr>
+        <p:style>
+          <a:lnRef idx="2">
+            <a:schemeClr val="dk1"/>
+          </a:lnRef>
+          <a:fillRef idx="1">
+            <a:schemeClr val="lt1"/>
+          </a:fillRef>
+          <a:effectRef idx="0">
+            <a:schemeClr val="dk1"/>
+          </a:effectRef>
+          <a:fontRef idx="minor">
+            <a:schemeClr val="dk1"/>
+          </a:fontRef>
+        </p:style>
+      </p:cxnSp>
+      <p:cxnSp>
+        <p:nvCxnSpPr>
+          <p:cNvPr id="16" name="直接箭头连接符 15">
+            <a:extLst>
+              <a:ext uri="{FF2B5EF4-FFF2-40B4-BE49-F238E27FC236}">
+                <a16:creationId xmlns:a16="http://schemas.microsoft.com/office/drawing/2014/main" id="{9A69060F-8A13-4322-9FBC-E7591799508B}"/>
+              </a:ext>
+            </a:extLst>
+          </p:cNvPr>
+          <p:cNvCxnSpPr/>
+          <p:nvPr/>
+        </p:nvCxnSpPr>
+        <p:spPr>
+          <a:xfrm flipV="1">
+            <a:off x="3239566" y="4605614"/>
+            <a:ext cx="265438" cy="2"/>
+          </a:xfrm>
+          <a:prstGeom prst="straightConnector1">
+            <a:avLst/>
+          </a:prstGeom>
+          <a:ln w="25400">
+            <a:tailEnd type="triangle"/>
+          </a:ln>
+        </p:spPr>
+        <p:style>
+          <a:lnRef idx="2">
+            <a:schemeClr val="dk1"/>
+          </a:lnRef>
+          <a:fillRef idx="1">
+            <a:schemeClr val="lt1"/>
+          </a:fillRef>
+          <a:effectRef idx="0">
+            <a:schemeClr val="dk1"/>
+          </a:effectRef>
+          <a:fontRef idx="minor">
+            <a:schemeClr val="dk1"/>
+          </a:fontRef>
+        </p:style>
+      </p:cxnSp>
+      <p:sp>
+        <p:nvSpPr>
+          <p:cNvPr id="19" name="矩形 18">
+            <a:extLst>
+              <a:ext uri="{FF2B5EF4-FFF2-40B4-BE49-F238E27FC236}">
+                <a16:creationId xmlns:a16="http://schemas.microsoft.com/office/drawing/2014/main" id="{797420EA-CCB2-40E4-932A-313A3A0C997D}"/>
+              </a:ext>
+            </a:extLst>
+          </p:cNvPr>
+          <p:cNvSpPr/>
+          <p:nvPr/>
+        </p:nvSpPr>
+        <p:spPr>
+          <a:xfrm>
+            <a:off x="1337481" y="887104"/>
+            <a:ext cx="143301" cy="648269"/>
+          </a:xfrm>
+          <a:prstGeom prst="rect">
+            <a:avLst/>
+          </a:prstGeom>
+        </p:spPr>
+        <p:style>
+          <a:lnRef idx="2">
+            <a:schemeClr val="dk1"/>
+          </a:lnRef>
+          <a:fillRef idx="1">
+            <a:schemeClr val="lt1"/>
+          </a:fillRef>
+          <a:effectRef idx="0">
+            <a:schemeClr val="dk1"/>
+          </a:effectRef>
+          <a:fontRef idx="minor">
+            <a:schemeClr val="dk1"/>
+          </a:fontRef>
+        </p:style>
+        <p:txBody>
+          <a:bodyPr rtlCol="0" anchor="ctr"/>
+          <a:lstStyle/>
+          <a:p>
+            <a:pPr algn="ctr"/>
+            <a:endParaRPr lang="zh-CN" altLang="en-US" dirty="0"/>
+          </a:p>
+        </p:txBody>
+      </p:sp>
+      <p:sp>
+        <p:nvSpPr>
+          <p:cNvPr id="20" name="矩形 19">
+            <a:extLst>
+              <a:ext uri="{FF2B5EF4-FFF2-40B4-BE49-F238E27FC236}">
+                <a16:creationId xmlns:a16="http://schemas.microsoft.com/office/drawing/2014/main" id="{AC5224BF-96FC-4FD5-AF27-DA327D662E72}"/>
+              </a:ext>
+            </a:extLst>
+          </p:cNvPr>
+          <p:cNvSpPr/>
+          <p:nvPr/>
+        </p:nvSpPr>
+        <p:spPr>
+          <a:xfrm>
+            <a:off x="1543334" y="715369"/>
+            <a:ext cx="143301" cy="820004"/>
+          </a:xfrm>
+          <a:prstGeom prst="rect">
+            <a:avLst/>
+          </a:prstGeom>
+        </p:spPr>
+        <p:style>
+          <a:lnRef idx="2">
+            <a:schemeClr val="dk1"/>
+          </a:lnRef>
+          <a:fillRef idx="1">
+            <a:schemeClr val="lt1"/>
+          </a:fillRef>
+          <a:effectRef idx="0">
+            <a:schemeClr val="dk1"/>
+          </a:effectRef>
+          <a:fontRef idx="minor">
+            <a:schemeClr val="dk1"/>
+          </a:fontRef>
+        </p:style>
+        <p:txBody>
+          <a:bodyPr rtlCol="0" anchor="ctr"/>
+          <a:lstStyle/>
+          <a:p>
+            <a:pPr algn="ctr"/>
+            <a:endParaRPr lang="zh-CN" altLang="en-US" dirty="0"/>
+          </a:p>
+        </p:txBody>
+      </p:sp>
+      <p:sp>
+        <p:nvSpPr>
+          <p:cNvPr id="21" name="矩形 20">
+            <a:extLst>
+              <a:ext uri="{FF2B5EF4-FFF2-40B4-BE49-F238E27FC236}">
+                <a16:creationId xmlns:a16="http://schemas.microsoft.com/office/drawing/2014/main" id="{6F864260-C5B0-4167-A8E8-34607E8DC3C8}"/>
+              </a:ext>
+            </a:extLst>
+          </p:cNvPr>
+          <p:cNvSpPr/>
+          <p:nvPr/>
+        </p:nvSpPr>
+        <p:spPr>
+          <a:xfrm>
+            <a:off x="1749187" y="887104"/>
+            <a:ext cx="143301" cy="648269"/>
+          </a:xfrm>
+          <a:prstGeom prst="rect">
+            <a:avLst/>
+          </a:prstGeom>
+        </p:spPr>
+        <p:style>
+          <a:lnRef idx="2">
+            <a:schemeClr val="dk1"/>
+          </a:lnRef>
+          <a:fillRef idx="1">
+            <a:schemeClr val="lt1"/>
+          </a:fillRef>
+          <a:effectRef idx="0">
+            <a:schemeClr val="dk1"/>
+          </a:effectRef>
+          <a:fontRef idx="minor">
+            <a:schemeClr val="dk1"/>
+          </a:fontRef>
+        </p:style>
+        <p:txBody>
+          <a:bodyPr rtlCol="0" anchor="ctr"/>
+          <a:lstStyle/>
+          <a:p>
+            <a:pPr algn="ctr"/>
+            <a:endParaRPr lang="zh-CN" altLang="en-US" dirty="0"/>
+          </a:p>
+        </p:txBody>
+      </p:sp>
+      <p:sp>
+        <p:nvSpPr>
+          <p:cNvPr id="22" name="矩形 21">
+            <a:extLst>
+              <a:ext uri="{FF2B5EF4-FFF2-40B4-BE49-F238E27FC236}">
+                <a16:creationId xmlns:a16="http://schemas.microsoft.com/office/drawing/2014/main" id="{8D06F1BB-875C-4177-835D-5DEFE4B872D5}"/>
+              </a:ext>
+            </a:extLst>
+          </p:cNvPr>
+          <p:cNvSpPr/>
+          <p:nvPr/>
+        </p:nvSpPr>
+        <p:spPr>
+          <a:xfrm>
+            <a:off x="1955040" y="818865"/>
+            <a:ext cx="143301" cy="716508"/>
+          </a:xfrm>
+          <a:prstGeom prst="rect">
+            <a:avLst/>
+          </a:prstGeom>
+        </p:spPr>
+        <p:style>
+          <a:lnRef idx="2">
+            <a:schemeClr val="dk1"/>
+          </a:lnRef>
+          <a:fillRef idx="1">
+            <a:schemeClr val="lt1"/>
+          </a:fillRef>
+          <a:effectRef idx="0">
+            <a:schemeClr val="dk1"/>
+          </a:effectRef>
+          <a:fontRef idx="minor">
+            <a:schemeClr val="dk1"/>
+          </a:fontRef>
+        </p:style>
+        <p:txBody>
+          <a:bodyPr rtlCol="0" anchor="ctr"/>
+          <a:lstStyle/>
+          <a:p>
+            <a:pPr algn="ctr"/>
+            <a:endParaRPr lang="zh-CN" altLang="en-US" dirty="0"/>
+          </a:p>
+        </p:txBody>
+      </p:sp>
+      <p:sp>
+        <p:nvSpPr>
+          <p:cNvPr id="23" name="矩形 22">
+            <a:extLst>
+              <a:ext uri="{FF2B5EF4-FFF2-40B4-BE49-F238E27FC236}">
+                <a16:creationId xmlns:a16="http://schemas.microsoft.com/office/drawing/2014/main" id="{E8C822FD-1CC2-4609-8009-9C3D419381C3}"/>
+              </a:ext>
+            </a:extLst>
+          </p:cNvPr>
+          <p:cNvSpPr/>
+          <p:nvPr/>
+        </p:nvSpPr>
+        <p:spPr>
+          <a:xfrm>
+            <a:off x="1126511" y="1001972"/>
+            <a:ext cx="143301" cy="533401"/>
+          </a:xfrm>
+          <a:prstGeom prst="rect">
+            <a:avLst/>
+          </a:prstGeom>
+        </p:spPr>
+        <p:style>
+          <a:lnRef idx="2">
+            <a:schemeClr val="dk1"/>
+          </a:lnRef>
+          <a:fillRef idx="1">
+            <a:schemeClr val="lt1"/>
+          </a:fillRef>
+          <a:effectRef idx="0">
+            <a:schemeClr val="dk1"/>
+          </a:effectRef>
+          <a:fontRef idx="minor">
+            <a:schemeClr val="dk1"/>
+          </a:fontRef>
+        </p:style>
+        <p:txBody>
+          <a:bodyPr rtlCol="0" anchor="ctr"/>
+          <a:lstStyle/>
+          <a:p>
+            <a:pPr algn="ctr"/>
+            <a:endParaRPr lang="zh-CN" altLang="en-US" dirty="0"/>
+          </a:p>
+        </p:txBody>
+      </p:sp>
     </p:spTree>
     <p:extLst>
       <p:ext uri="{BB962C8B-B14F-4D97-AF65-F5344CB8AC3E}">

</xml_diff>